<commit_message>
updating codes esp for recruitment outcomes
</commit_message>
<xml_diff>
--- a/code/recruitment figures/BMI outcomes bar plot/BMIOutcomes_barplots_combined.pptx
+++ b/code/recruitment figures/BMI outcomes bar plot/BMIOutcomes_barplots_combined.pptx
@@ -261,7 +261,7 @@
           <a:p>
             <a:fld id="{9508DD5D-228E-4B3D-8D6A-57E2815CF953}" type="datetimeFigureOut">
               <a:rPr lang="en-US" smtClean="0"/>
-              <a:t>6/6/2024</a:t>
+              <a:t>6/19/2024</a:t>
             </a:fld>
             <a:endParaRPr lang="en-US"/>
           </a:p>
@@ -459,7 +459,7 @@
           <a:p>
             <a:fld id="{9508DD5D-228E-4B3D-8D6A-57E2815CF953}" type="datetimeFigureOut">
               <a:rPr lang="en-US" smtClean="0"/>
-              <a:t>6/6/2024</a:t>
+              <a:t>6/19/2024</a:t>
             </a:fld>
             <a:endParaRPr lang="en-US"/>
           </a:p>
@@ -667,7 +667,7 @@
           <a:p>
             <a:fld id="{9508DD5D-228E-4B3D-8D6A-57E2815CF953}" type="datetimeFigureOut">
               <a:rPr lang="en-US" smtClean="0"/>
-              <a:t>6/6/2024</a:t>
+              <a:t>6/19/2024</a:t>
             </a:fld>
             <a:endParaRPr lang="en-US"/>
           </a:p>
@@ -865,7 +865,7 @@
           <a:p>
             <a:fld id="{9508DD5D-228E-4B3D-8D6A-57E2815CF953}" type="datetimeFigureOut">
               <a:rPr lang="en-US" smtClean="0"/>
-              <a:t>6/6/2024</a:t>
+              <a:t>6/19/2024</a:t>
             </a:fld>
             <a:endParaRPr lang="en-US"/>
           </a:p>
@@ -1140,7 +1140,7 @@
           <a:p>
             <a:fld id="{9508DD5D-228E-4B3D-8D6A-57E2815CF953}" type="datetimeFigureOut">
               <a:rPr lang="en-US" smtClean="0"/>
-              <a:t>6/6/2024</a:t>
+              <a:t>6/19/2024</a:t>
             </a:fld>
             <a:endParaRPr lang="en-US"/>
           </a:p>
@@ -1405,7 +1405,7 @@
           <a:p>
             <a:fld id="{9508DD5D-228E-4B3D-8D6A-57E2815CF953}" type="datetimeFigureOut">
               <a:rPr lang="en-US" smtClean="0"/>
-              <a:t>6/6/2024</a:t>
+              <a:t>6/19/2024</a:t>
             </a:fld>
             <a:endParaRPr lang="en-US"/>
           </a:p>
@@ -1817,7 +1817,7 @@
           <a:p>
             <a:fld id="{9508DD5D-228E-4B3D-8D6A-57E2815CF953}" type="datetimeFigureOut">
               <a:rPr lang="en-US" smtClean="0"/>
-              <a:t>6/6/2024</a:t>
+              <a:t>6/19/2024</a:t>
             </a:fld>
             <a:endParaRPr lang="en-US"/>
           </a:p>
@@ -1958,7 +1958,7 @@
           <a:p>
             <a:fld id="{9508DD5D-228E-4B3D-8D6A-57E2815CF953}" type="datetimeFigureOut">
               <a:rPr lang="en-US" smtClean="0"/>
-              <a:t>6/6/2024</a:t>
+              <a:t>6/19/2024</a:t>
             </a:fld>
             <a:endParaRPr lang="en-US"/>
           </a:p>
@@ -2071,7 +2071,7 @@
           <a:p>
             <a:fld id="{9508DD5D-228E-4B3D-8D6A-57E2815CF953}" type="datetimeFigureOut">
               <a:rPr lang="en-US" smtClean="0"/>
-              <a:t>6/6/2024</a:t>
+              <a:t>6/19/2024</a:t>
             </a:fld>
             <a:endParaRPr lang="en-US"/>
           </a:p>
@@ -2382,7 +2382,7 @@
           <a:p>
             <a:fld id="{9508DD5D-228E-4B3D-8D6A-57E2815CF953}" type="datetimeFigureOut">
               <a:rPr lang="en-US" smtClean="0"/>
-              <a:t>6/6/2024</a:t>
+              <a:t>6/19/2024</a:t>
             </a:fld>
             <a:endParaRPr lang="en-US"/>
           </a:p>
@@ -2670,7 +2670,7 @@
           <a:p>
             <a:fld id="{9508DD5D-228E-4B3D-8D6A-57E2815CF953}" type="datetimeFigureOut">
               <a:rPr lang="en-US" smtClean="0"/>
-              <a:t>6/6/2024</a:t>
+              <a:t>6/19/2024</a:t>
             </a:fld>
             <a:endParaRPr lang="en-US"/>
           </a:p>
@@ -2911,7 +2911,7 @@
           <a:p>
             <a:fld id="{9508DD5D-228E-4B3D-8D6A-57E2815CF953}" type="datetimeFigureOut">
               <a:rPr lang="en-US" smtClean="0"/>
-              <a:t>6/6/2024</a:t>
+              <a:t>6/19/2024</a:t>
             </a:fld>
             <a:endParaRPr lang="en-US"/>
           </a:p>

</xml_diff>

<commit_message>
changing obese --> obesity
</commit_message>
<xml_diff>
--- a/code/recruitment figures/BMI outcomes bar plot/BMIOutcomes_barplots_combined.pptx
+++ b/code/recruitment figures/BMI outcomes bar plot/BMIOutcomes_barplots_combined.pptx
@@ -261,7 +261,7 @@
           <a:p>
             <a:fld id="{9508DD5D-228E-4B3D-8D6A-57E2815CF953}" type="datetimeFigureOut">
               <a:rPr lang="en-US" smtClean="0"/>
-              <a:t>6/19/2024</a:t>
+              <a:t>6/20/2024</a:t>
             </a:fld>
             <a:endParaRPr lang="en-US"/>
           </a:p>
@@ -459,7 +459,7 @@
           <a:p>
             <a:fld id="{9508DD5D-228E-4B3D-8D6A-57E2815CF953}" type="datetimeFigureOut">
               <a:rPr lang="en-US" smtClean="0"/>
-              <a:t>6/19/2024</a:t>
+              <a:t>6/20/2024</a:t>
             </a:fld>
             <a:endParaRPr lang="en-US"/>
           </a:p>
@@ -667,7 +667,7 @@
           <a:p>
             <a:fld id="{9508DD5D-228E-4B3D-8D6A-57E2815CF953}" type="datetimeFigureOut">
               <a:rPr lang="en-US" smtClean="0"/>
-              <a:t>6/19/2024</a:t>
+              <a:t>6/20/2024</a:t>
             </a:fld>
             <a:endParaRPr lang="en-US"/>
           </a:p>
@@ -865,7 +865,7 @@
           <a:p>
             <a:fld id="{9508DD5D-228E-4B3D-8D6A-57E2815CF953}" type="datetimeFigureOut">
               <a:rPr lang="en-US" smtClean="0"/>
-              <a:t>6/19/2024</a:t>
+              <a:t>6/20/2024</a:t>
             </a:fld>
             <a:endParaRPr lang="en-US"/>
           </a:p>
@@ -1140,7 +1140,7 @@
           <a:p>
             <a:fld id="{9508DD5D-228E-4B3D-8D6A-57E2815CF953}" type="datetimeFigureOut">
               <a:rPr lang="en-US" smtClean="0"/>
-              <a:t>6/19/2024</a:t>
+              <a:t>6/20/2024</a:t>
             </a:fld>
             <a:endParaRPr lang="en-US"/>
           </a:p>
@@ -1405,7 +1405,7 @@
           <a:p>
             <a:fld id="{9508DD5D-228E-4B3D-8D6A-57E2815CF953}" type="datetimeFigureOut">
               <a:rPr lang="en-US" smtClean="0"/>
-              <a:t>6/19/2024</a:t>
+              <a:t>6/20/2024</a:t>
             </a:fld>
             <a:endParaRPr lang="en-US"/>
           </a:p>
@@ -1817,7 +1817,7 @@
           <a:p>
             <a:fld id="{9508DD5D-228E-4B3D-8D6A-57E2815CF953}" type="datetimeFigureOut">
               <a:rPr lang="en-US" smtClean="0"/>
-              <a:t>6/19/2024</a:t>
+              <a:t>6/20/2024</a:t>
             </a:fld>
             <a:endParaRPr lang="en-US"/>
           </a:p>
@@ -1958,7 +1958,7 @@
           <a:p>
             <a:fld id="{9508DD5D-228E-4B3D-8D6A-57E2815CF953}" type="datetimeFigureOut">
               <a:rPr lang="en-US" smtClean="0"/>
-              <a:t>6/19/2024</a:t>
+              <a:t>6/20/2024</a:t>
             </a:fld>
             <a:endParaRPr lang="en-US"/>
           </a:p>
@@ -2071,7 +2071,7 @@
           <a:p>
             <a:fld id="{9508DD5D-228E-4B3D-8D6A-57E2815CF953}" type="datetimeFigureOut">
               <a:rPr lang="en-US" smtClean="0"/>
-              <a:t>6/19/2024</a:t>
+              <a:t>6/20/2024</a:t>
             </a:fld>
             <a:endParaRPr lang="en-US"/>
           </a:p>
@@ -2382,7 +2382,7 @@
           <a:p>
             <a:fld id="{9508DD5D-228E-4B3D-8D6A-57E2815CF953}" type="datetimeFigureOut">
               <a:rPr lang="en-US" smtClean="0"/>
-              <a:t>6/19/2024</a:t>
+              <a:t>6/20/2024</a:t>
             </a:fld>
             <a:endParaRPr lang="en-US"/>
           </a:p>
@@ -2670,7 +2670,7 @@
           <a:p>
             <a:fld id="{9508DD5D-228E-4B3D-8D6A-57E2815CF953}" type="datetimeFigureOut">
               <a:rPr lang="en-US" smtClean="0"/>
-              <a:t>6/19/2024</a:t>
+              <a:t>6/20/2024</a:t>
             </a:fld>
             <a:endParaRPr lang="en-US"/>
           </a:p>
@@ -2911,7 +2911,7 @@
           <a:p>
             <a:fld id="{9508DD5D-228E-4B3D-8D6A-57E2815CF953}" type="datetimeFigureOut">
               <a:rPr lang="en-US" smtClean="0"/>
-              <a:t>6/19/2024</a:t>
+              <a:t>6/20/2024</a:t>
             </a:fld>
             <a:endParaRPr lang="en-US"/>
           </a:p>
@@ -3343,9 +3343,9 @@
         <p:grpSpPr>
           <a:xfrm>
             <a:off x="0" y="-324091"/>
-            <a:ext cx="12151639" cy="7182091"/>
+            <a:ext cx="12151638" cy="7182091"/>
             <a:chOff x="29398" y="38205"/>
-            <a:chExt cx="10126365" cy="5985076"/>
+            <a:chExt cx="10126364" cy="5985076"/>
           </a:xfrm>
         </p:grpSpPr>
         <p:pic>
@@ -3375,8 +3375,8 @@
           </p:blipFill>
           <p:spPr>
             <a:xfrm>
-              <a:off x="180636" y="38205"/>
-              <a:ext cx="9975127" cy="5985076"/>
+              <a:off x="180637" y="38205"/>
+              <a:ext cx="9975125" cy="5985076"/>
             </a:xfrm>
             <a:prstGeom prst="rect">
               <a:avLst/>
@@ -3467,9 +3467,9 @@
         <p:grpSpPr>
           <a:xfrm>
             <a:off x="38099" y="-308199"/>
-            <a:ext cx="12115802" cy="7166199"/>
+            <a:ext cx="12097494" cy="7166199"/>
             <a:chOff x="-1" y="17939"/>
-            <a:chExt cx="10570009" cy="6271067"/>
+            <a:chExt cx="10554037" cy="6271067"/>
           </a:xfrm>
         </p:grpSpPr>
         <p:grpSp>
@@ -3486,10 +3486,10 @@
           </p:nvGrpSpPr>
           <p:grpSpPr>
             <a:xfrm>
-              <a:off x="118231" y="17939"/>
-              <a:ext cx="10451777" cy="6271067"/>
-              <a:chOff x="38425" y="-269701"/>
-              <a:chExt cx="10451777" cy="6271067"/>
+              <a:off x="134202" y="17939"/>
+              <a:ext cx="10419834" cy="6271067"/>
+              <a:chOff x="54396" y="-269701"/>
+              <a:chExt cx="10419834" cy="6271067"/>
             </a:xfrm>
           </p:grpSpPr>
           <p:pic>
@@ -3519,8 +3519,8 @@
             </p:blipFill>
             <p:spPr>
               <a:xfrm>
-                <a:off x="38425" y="-269701"/>
-                <a:ext cx="10451777" cy="6271067"/>
+                <a:off x="54396" y="-269701"/>
+                <a:ext cx="10419834" cy="6271067"/>
               </a:xfrm>
               <a:prstGeom prst="rect">
                 <a:avLst/>

</xml_diff>

<commit_message>
obese > obesity code and updating powerpoints
</commit_message>
<xml_diff>
--- a/code/recruitment figures/BMI outcomes bar plot/BMIOutcomes_barplots_combined.pptx
+++ b/code/recruitment figures/BMI outcomes bar plot/BMIOutcomes_barplots_combined.pptx
@@ -3343,9 +3343,9 @@
         <p:grpSpPr>
           <a:xfrm>
             <a:off x="0" y="-324091"/>
-            <a:ext cx="12151638" cy="7182091"/>
+            <a:ext cx="12151638" cy="7182090"/>
             <a:chOff x="29398" y="38205"/>
-            <a:chExt cx="10126364" cy="5985076"/>
+            <a:chExt cx="10126364" cy="5985075"/>
           </a:xfrm>
         </p:grpSpPr>
         <p:pic>
@@ -3376,7 +3376,7 @@
           <p:spPr>
             <a:xfrm>
               <a:off x="180637" y="38205"/>
-              <a:ext cx="9975125" cy="5985076"/>
+              <a:ext cx="9975125" cy="5985075"/>
             </a:xfrm>
             <a:prstGeom prst="rect">
               <a:avLst/>

</xml_diff>